<commit_message>
modified:   hw_notebook.ipynb 	modified:   notes.pptx
</commit_message>
<xml_diff>
--- a/notes.pptx
+++ b/notes.pptx
@@ -6,6 +6,9 @@
   </p:sldMasterIdLst>
   <p:sldIdLst>
     <p:sldId id="256" r:id="rId2"/>
+    <p:sldId id="257" r:id="rId3"/>
+    <p:sldId id="258" r:id="rId4"/>
+    <p:sldId id="259" r:id="rId5"/>
   </p:sldIdLst>
   <p:sldSz cx="12192000" cy="6858000"/>
   <p:notesSz cx="6858000" cy="9144000"/>
@@ -104,6 +107,11 @@
       </a:defRPr>
     </a:lvl9pPr>
   </p:defaultTextStyle>
+  <p:extLst>
+    <p:ext uri="{EFAFB233-063F-42B5-8137-9DF3F51BA10A}">
+      <p15:sldGuideLst xmlns:p15="http://schemas.microsoft.com/office/powerpoint/2012/main"/>
+    </p:ext>
+  </p:extLst>
 </p:presentation>
 </file>
 
@@ -256,7 +264,7 @@
           <a:p>
             <a:fld id="{F27C1779-C630-4BA7-BFA9-9A40662A138F}" type="datetimeFigureOut">
               <a:rPr lang="es-MX" smtClean="0"/>
-              <a:t>03/12/2024</a:t>
+              <a:t>04/12/2024</a:t>
             </a:fld>
             <a:endParaRPr lang="es-MX"/>
           </a:p>
@@ -456,7 +464,7 @@
           <a:p>
             <a:fld id="{F27C1779-C630-4BA7-BFA9-9A40662A138F}" type="datetimeFigureOut">
               <a:rPr lang="es-MX" smtClean="0"/>
-              <a:t>03/12/2024</a:t>
+              <a:t>04/12/2024</a:t>
             </a:fld>
             <a:endParaRPr lang="es-MX"/>
           </a:p>
@@ -666,7 +674,7 @@
           <a:p>
             <a:fld id="{F27C1779-C630-4BA7-BFA9-9A40662A138F}" type="datetimeFigureOut">
               <a:rPr lang="es-MX" smtClean="0"/>
-              <a:t>03/12/2024</a:t>
+              <a:t>04/12/2024</a:t>
             </a:fld>
             <a:endParaRPr lang="es-MX"/>
           </a:p>
@@ -866,7 +874,7 @@
           <a:p>
             <a:fld id="{F27C1779-C630-4BA7-BFA9-9A40662A138F}" type="datetimeFigureOut">
               <a:rPr lang="es-MX" smtClean="0"/>
-              <a:t>03/12/2024</a:t>
+              <a:t>04/12/2024</a:t>
             </a:fld>
             <a:endParaRPr lang="es-MX"/>
           </a:p>
@@ -1142,7 +1150,7 @@
           <a:p>
             <a:fld id="{F27C1779-C630-4BA7-BFA9-9A40662A138F}" type="datetimeFigureOut">
               <a:rPr lang="es-MX" smtClean="0"/>
-              <a:t>03/12/2024</a:t>
+              <a:t>04/12/2024</a:t>
             </a:fld>
             <a:endParaRPr lang="es-MX"/>
           </a:p>
@@ -1410,7 +1418,7 @@
           <a:p>
             <a:fld id="{F27C1779-C630-4BA7-BFA9-9A40662A138F}" type="datetimeFigureOut">
               <a:rPr lang="es-MX" smtClean="0"/>
-              <a:t>03/12/2024</a:t>
+              <a:t>04/12/2024</a:t>
             </a:fld>
             <a:endParaRPr lang="es-MX"/>
           </a:p>
@@ -1825,7 +1833,7 @@
           <a:p>
             <a:fld id="{F27C1779-C630-4BA7-BFA9-9A40662A138F}" type="datetimeFigureOut">
               <a:rPr lang="es-MX" smtClean="0"/>
-              <a:t>03/12/2024</a:t>
+              <a:t>04/12/2024</a:t>
             </a:fld>
             <a:endParaRPr lang="es-MX"/>
           </a:p>
@@ -1967,7 +1975,7 @@
           <a:p>
             <a:fld id="{F27C1779-C630-4BA7-BFA9-9A40662A138F}" type="datetimeFigureOut">
               <a:rPr lang="es-MX" smtClean="0"/>
-              <a:t>03/12/2024</a:t>
+              <a:t>04/12/2024</a:t>
             </a:fld>
             <a:endParaRPr lang="es-MX"/>
           </a:p>
@@ -2080,7 +2088,7 @@
           <a:p>
             <a:fld id="{F27C1779-C630-4BA7-BFA9-9A40662A138F}" type="datetimeFigureOut">
               <a:rPr lang="es-MX" smtClean="0"/>
-              <a:t>03/12/2024</a:t>
+              <a:t>04/12/2024</a:t>
             </a:fld>
             <a:endParaRPr lang="es-MX"/>
           </a:p>
@@ -2393,7 +2401,7 @@
           <a:p>
             <a:fld id="{F27C1779-C630-4BA7-BFA9-9A40662A138F}" type="datetimeFigureOut">
               <a:rPr lang="es-MX" smtClean="0"/>
-              <a:t>03/12/2024</a:t>
+              <a:t>04/12/2024</a:t>
             </a:fld>
             <a:endParaRPr lang="es-MX"/>
           </a:p>
@@ -2682,7 +2690,7 @@
           <a:p>
             <a:fld id="{F27C1779-C630-4BA7-BFA9-9A40662A138F}" type="datetimeFigureOut">
               <a:rPr lang="es-MX" smtClean="0"/>
-              <a:t>03/12/2024</a:t>
+              <a:t>04/12/2024</a:t>
             </a:fld>
             <a:endParaRPr lang="es-MX"/>
           </a:p>
@@ -2925,7 +2933,7 @@
           <a:p>
             <a:fld id="{F27C1779-C630-4BA7-BFA9-9A40662A138F}" type="datetimeFigureOut">
               <a:rPr lang="es-MX" smtClean="0"/>
-              <a:t>03/12/2024</a:t>
+              <a:t>04/12/2024</a:t>
             </a:fld>
             <a:endParaRPr lang="es-MX"/>
           </a:p>
@@ -5385,6 +5393,234 @@
     <p:extLst>
       <p:ext uri="{BB962C8B-B14F-4D97-AF65-F5344CB8AC3E}">
         <p14:creationId xmlns:p14="http://schemas.microsoft.com/office/powerpoint/2010/main" val="3450194923"/>
+      </p:ext>
+    </p:extLst>
+  </p:cSld>
+  <p:clrMapOvr>
+    <a:masterClrMapping/>
+  </p:clrMapOvr>
+</p:sld>
+</file>
+
+<file path=ppt/slides/slide2.xml><?xml version="1.0" encoding="utf-8"?>
+<p:sld xmlns:a="http://schemas.openxmlformats.org/drawingml/2006/main" xmlns:r="http://schemas.openxmlformats.org/officeDocument/2006/relationships" xmlns:p="http://schemas.openxmlformats.org/presentationml/2006/main">
+  <p:cSld>
+    <p:spTree>
+      <p:nvGrpSpPr>
+        <p:cNvPr id="1" name=""/>
+        <p:cNvGrpSpPr/>
+        <p:nvPr/>
+      </p:nvGrpSpPr>
+      <p:grpSpPr>
+        <a:xfrm>
+          <a:off x="0" y="0"/>
+          <a:ext cx="0" cy="0"/>
+          <a:chOff x="0" y="0"/>
+          <a:chExt cx="0" cy="0"/>
+        </a:xfrm>
+      </p:grpSpPr>
+      <p:pic>
+        <p:nvPicPr>
+          <p:cNvPr id="6" name="Imagen 5">
+            <a:extLst>
+              <a:ext uri="{FF2B5EF4-FFF2-40B4-BE49-F238E27FC236}">
+                <a16:creationId xmlns:a16="http://schemas.microsoft.com/office/drawing/2014/main" id="{B7DCDE1A-39F9-EE6B-B72B-717E86D4E16B}"/>
+              </a:ext>
+            </a:extLst>
+          </p:cNvPr>
+          <p:cNvPicPr>
+            <a:picLocks noChangeAspect="1"/>
+          </p:cNvPicPr>
+          <p:nvPr/>
+        </p:nvPicPr>
+        <p:blipFill>
+          <a:blip r:embed="rId2"/>
+          <a:stretch>
+            <a:fillRect/>
+          </a:stretch>
+        </p:blipFill>
+        <p:spPr>
+          <a:xfrm>
+            <a:off x="0" y="0"/>
+            <a:ext cx="12192000" cy="6858000"/>
+          </a:xfrm>
+          <a:prstGeom prst="rect">
+            <a:avLst/>
+          </a:prstGeom>
+        </p:spPr>
+      </p:pic>
+      <p:sp>
+        <p:nvSpPr>
+          <p:cNvPr id="7" name="CuadroTexto 6">
+            <a:extLst>
+              <a:ext uri="{FF2B5EF4-FFF2-40B4-BE49-F238E27FC236}">
+                <a16:creationId xmlns:a16="http://schemas.microsoft.com/office/drawing/2014/main" id="{C6590816-D29F-0C4A-7E36-88026DB35022}"/>
+              </a:ext>
+            </a:extLst>
+          </p:cNvPr>
+          <p:cNvSpPr txBox="1"/>
+          <p:nvPr/>
+        </p:nvSpPr>
+        <p:spPr>
+          <a:xfrm>
+            <a:off x="8928446" y="4560546"/>
+            <a:ext cx="1021799" cy="369332"/>
+          </a:xfrm>
+          <a:prstGeom prst="rect">
+            <a:avLst/>
+          </a:prstGeom>
+          <a:noFill/>
+        </p:spPr>
+        <p:txBody>
+          <a:bodyPr wrap="square" rtlCol="0">
+            <a:spAutoFit/>
+          </a:bodyPr>
+          <a:lstStyle/>
+          <a:p>
+            <a:r>
+              <a:rPr lang="es-MX" dirty="0">
+                <a:solidFill>
+                  <a:srgbClr val="FFFF00"/>
+                </a:solidFill>
+              </a:rPr>
+              <a:t>1st run</a:t>
+            </a:r>
+          </a:p>
+        </p:txBody>
+      </p:sp>
+    </p:spTree>
+    <p:extLst>
+      <p:ext uri="{BB962C8B-B14F-4D97-AF65-F5344CB8AC3E}">
+        <p14:creationId xmlns:p14="http://schemas.microsoft.com/office/powerpoint/2010/main" val="2769153114"/>
+      </p:ext>
+    </p:extLst>
+  </p:cSld>
+  <p:clrMapOvr>
+    <a:masterClrMapping/>
+  </p:clrMapOvr>
+</p:sld>
+</file>
+
+<file path=ppt/slides/slide3.xml><?xml version="1.0" encoding="utf-8"?>
+<p:sld xmlns:a="http://schemas.openxmlformats.org/drawingml/2006/main" xmlns:r="http://schemas.openxmlformats.org/officeDocument/2006/relationships" xmlns:p="http://schemas.openxmlformats.org/presentationml/2006/main">
+  <p:cSld>
+    <p:spTree>
+      <p:nvGrpSpPr>
+        <p:cNvPr id="1" name=""/>
+        <p:cNvGrpSpPr/>
+        <p:nvPr/>
+      </p:nvGrpSpPr>
+      <p:grpSpPr>
+        <a:xfrm>
+          <a:off x="0" y="0"/>
+          <a:ext cx="0" cy="0"/>
+          <a:chOff x="0" y="0"/>
+          <a:chExt cx="0" cy="0"/>
+        </a:xfrm>
+      </p:grpSpPr>
+      <p:pic>
+        <p:nvPicPr>
+          <p:cNvPr id="3" name="Imagen 2">
+            <a:extLst>
+              <a:ext uri="{FF2B5EF4-FFF2-40B4-BE49-F238E27FC236}">
+                <a16:creationId xmlns:a16="http://schemas.microsoft.com/office/drawing/2014/main" id="{E75B69D9-6C82-629B-D0C3-48057C4802E7}"/>
+              </a:ext>
+            </a:extLst>
+          </p:cNvPr>
+          <p:cNvPicPr>
+            <a:picLocks noChangeAspect="1"/>
+          </p:cNvPicPr>
+          <p:nvPr/>
+        </p:nvPicPr>
+        <p:blipFill>
+          <a:blip r:embed="rId2"/>
+          <a:stretch>
+            <a:fillRect/>
+          </a:stretch>
+        </p:blipFill>
+        <p:spPr>
+          <a:xfrm>
+            <a:off x="0" y="0"/>
+            <a:ext cx="12192000" cy="6858000"/>
+          </a:xfrm>
+          <a:prstGeom prst="rect">
+            <a:avLst/>
+          </a:prstGeom>
+        </p:spPr>
+      </p:pic>
+      <p:sp>
+        <p:nvSpPr>
+          <p:cNvPr id="4" name="CuadroTexto 3">
+            <a:extLst>
+              <a:ext uri="{FF2B5EF4-FFF2-40B4-BE49-F238E27FC236}">
+                <a16:creationId xmlns:a16="http://schemas.microsoft.com/office/drawing/2014/main" id="{2CCBDAA3-DE2A-7FB7-1C91-2D2F462150A1}"/>
+              </a:ext>
+            </a:extLst>
+          </p:cNvPr>
+          <p:cNvSpPr txBox="1"/>
+          <p:nvPr/>
+        </p:nvSpPr>
+        <p:spPr>
+          <a:xfrm>
+            <a:off x="8928446" y="4560546"/>
+            <a:ext cx="1021799" cy="369332"/>
+          </a:xfrm>
+          <a:prstGeom prst="rect">
+            <a:avLst/>
+          </a:prstGeom>
+          <a:noFill/>
+        </p:spPr>
+        <p:txBody>
+          <a:bodyPr wrap="square" rtlCol="0">
+            <a:spAutoFit/>
+          </a:bodyPr>
+          <a:lstStyle/>
+          <a:p>
+            <a:r>
+              <a:rPr lang="es-MX" dirty="0">
+                <a:solidFill>
+                  <a:srgbClr val="FFFF00"/>
+                </a:solidFill>
+              </a:rPr>
+              <a:t>2nd run</a:t>
+            </a:r>
+          </a:p>
+        </p:txBody>
+      </p:sp>
+    </p:spTree>
+    <p:extLst>
+      <p:ext uri="{BB962C8B-B14F-4D97-AF65-F5344CB8AC3E}">
+        <p14:creationId xmlns:p14="http://schemas.microsoft.com/office/powerpoint/2010/main" val="3916858899"/>
+      </p:ext>
+    </p:extLst>
+  </p:cSld>
+  <p:clrMapOvr>
+    <a:masterClrMapping/>
+  </p:clrMapOvr>
+</p:sld>
+</file>
+
+<file path=ppt/slides/slide4.xml><?xml version="1.0" encoding="utf-8"?>
+<p:sld xmlns:a="http://schemas.openxmlformats.org/drawingml/2006/main" xmlns:r="http://schemas.openxmlformats.org/officeDocument/2006/relationships" xmlns:p="http://schemas.openxmlformats.org/presentationml/2006/main">
+  <p:cSld>
+    <p:spTree>
+      <p:nvGrpSpPr>
+        <p:cNvPr id="1" name=""/>
+        <p:cNvGrpSpPr/>
+        <p:nvPr/>
+      </p:nvGrpSpPr>
+      <p:grpSpPr>
+        <a:xfrm>
+          <a:off x="0" y="0"/>
+          <a:ext cx="0" cy="0"/>
+          <a:chOff x="0" y="0"/>
+          <a:chExt cx="0" cy="0"/>
+        </a:xfrm>
+      </p:grpSpPr>
+    </p:spTree>
+    <p:extLst>
+      <p:ext uri="{BB962C8B-B14F-4D97-AF65-F5344CB8AC3E}">
+        <p14:creationId xmlns:p14="http://schemas.microsoft.com/office/powerpoint/2010/main" val="1336342504"/>
       </p:ext>
     </p:extLst>
   </p:cSld>

</xml_diff>